<commit_message>
Updated ADCS-COMMS-GNSS presentation files
</commit_message>
<xml_diff>
--- a/Files/ADCS.pptx
+++ b/Files/ADCS.pptx
@@ -5,10 +5,10 @@
     <p:sldMasterId id="2147483648" r:id="rId1"/>
   </p:sldMasterIdLst>
   <p:notesMasterIdLst>
-    <p:notesMasterId r:id="rId14"/>
+    <p:notesMasterId r:id="rId15"/>
   </p:notesMasterIdLst>
   <p:handoutMasterIdLst>
-    <p:handoutMasterId r:id="rId15"/>
+    <p:handoutMasterId r:id="rId16"/>
   </p:handoutMasterIdLst>
   <p:sldIdLst>
     <p:sldId id="256" r:id="rId2"/>
@@ -20,9 +20,10 @@
     <p:sldId id="262" r:id="rId8"/>
     <p:sldId id="263" r:id="rId9"/>
     <p:sldId id="265" r:id="rId10"/>
-    <p:sldId id="266" r:id="rId11"/>
-    <p:sldId id="267" r:id="rId12"/>
-    <p:sldId id="268" r:id="rId13"/>
+    <p:sldId id="269" r:id="rId11"/>
+    <p:sldId id="266" r:id="rId12"/>
+    <p:sldId id="267" r:id="rId13"/>
+    <p:sldId id="268" r:id="rId14"/>
   </p:sldIdLst>
   <p:sldSz cx="12192000" cy="6858000"/>
   <p:notesSz cx="6858000" cy="9144000"/>
@@ -226,7 +227,7 @@
           <a:p>
             <a:fld id="{4EED1B3A-46F9-49FD-AD10-AFD7DDBFFFE7}" type="datetimeFigureOut">
               <a:rPr lang="fr-FR" smtClean="0"/>
-              <a:t>27/05/2019</a:t>
+              <a:t>28/05/2019</a:t>
             </a:fld>
             <a:endParaRPr lang="fr-FR"/>
           </a:p>
@@ -403,7 +404,7 @@
           <a:p>
             <a:fld id="{CBD02DE9-54A9-4CA7-91F3-710D21D0B6EC}" type="datetimeFigureOut">
               <a:rPr lang="en-US" smtClean="0"/>
-              <a:t>5/27/2019</a:t>
+              <a:t>5/28/2019</a:t>
             </a:fld>
             <a:endParaRPr lang="en-US" dirty="0"/>
           </a:p>
@@ -4712,7 +4713,22 @@
           <a:bodyPr/>
           <a:lstStyle/>
           <a:p>
-            <a:endParaRPr lang="fr-FR"/>
+            <a:r>
+              <a:rPr lang="fr-FR" dirty="0"/>
+              <a:t>Daniel Alvarez Cosme</a:t>
+            </a:r>
+          </a:p>
+          <a:p>
+            <a:r>
+              <a:rPr lang="fr-FR" dirty="0"/>
+              <a:t>Cédric Belmant</a:t>
+            </a:r>
+          </a:p>
+          <a:p>
+            <a:r>
+              <a:rPr lang="fr-FR" dirty="0"/>
+              <a:t>Paula Marin Banqué</a:t>
+            </a:r>
           </a:p>
         </p:txBody>
       </p:sp>
@@ -4823,6 +4839,249 @@
 </file>
 
 <file path=ppt/slides/slide10.xml><?xml version="1.0" encoding="utf-8"?>
+<p:sld xmlns:a="http://schemas.openxmlformats.org/drawingml/2006/main" xmlns:r="http://schemas.openxmlformats.org/officeDocument/2006/relationships" xmlns:p="http://schemas.openxmlformats.org/presentationml/2006/main">
+  <p:cSld>
+    <p:spTree>
+      <p:nvGrpSpPr>
+        <p:cNvPr id="1" name=""/>
+        <p:cNvGrpSpPr/>
+        <p:nvPr/>
+      </p:nvGrpSpPr>
+      <p:grpSpPr>
+        <a:xfrm>
+          <a:off x="0" y="0"/>
+          <a:ext cx="0" cy="0"/>
+          <a:chOff x="0" y="0"/>
+          <a:chExt cx="0" cy="0"/>
+        </a:xfrm>
+      </p:grpSpPr>
+      <p:sp>
+        <p:nvSpPr>
+          <p:cNvPr id="2" name="Title 1">
+            <a:extLst>
+              <a:ext uri="{FF2B5EF4-FFF2-40B4-BE49-F238E27FC236}">
+                <a16:creationId xmlns:a16="http://schemas.microsoft.com/office/drawing/2014/main" id="{D10FC7AA-C3CF-4208-ABF2-09E40ABBFC38}"/>
+              </a:ext>
+            </a:extLst>
+          </p:cNvPr>
+          <p:cNvSpPr>
+            <a:spLocks noGrp="1"/>
+          </p:cNvSpPr>
+          <p:nvPr>
+            <p:ph type="ctrTitle"/>
+          </p:nvPr>
+        </p:nvSpPr>
+        <p:spPr/>
+        <p:txBody>
+          <a:bodyPr/>
+          <a:lstStyle/>
+          <a:p>
+            <a:r>
+              <a:rPr lang="es-ES" sz="5867" dirty="0">
+                <a:latin typeface="Calibri"/>
+                <a:cs typeface="Calibri"/>
+              </a:rPr>
+              <a:t>Future</a:t>
+            </a:r>
+            <a:r>
+              <a:rPr lang="es-ES" dirty="0"/>
+              <a:t> </a:t>
+            </a:r>
+            <a:r>
+              <a:rPr lang="es-ES" sz="5867" dirty="0" err="1">
+                <a:latin typeface="Calibri"/>
+                <a:cs typeface="Calibri"/>
+              </a:rPr>
+              <a:t>work</a:t>
+            </a:r>
+            <a:endParaRPr lang="en-GB" sz="5867" dirty="0">
+              <a:latin typeface="Calibri"/>
+              <a:cs typeface="Calibri"/>
+            </a:endParaRPr>
+          </a:p>
+        </p:txBody>
+      </p:sp>
+      <p:sp>
+        <p:nvSpPr>
+          <p:cNvPr id="3" name="Subtitle 2">
+            <a:extLst>
+              <a:ext uri="{FF2B5EF4-FFF2-40B4-BE49-F238E27FC236}">
+                <a16:creationId xmlns:a16="http://schemas.microsoft.com/office/drawing/2014/main" id="{C1E4D737-E2EA-4A5F-944D-74A2FDC41A45}"/>
+              </a:ext>
+            </a:extLst>
+          </p:cNvPr>
+          <p:cNvSpPr>
+            <a:spLocks noGrp="1"/>
+          </p:cNvSpPr>
+          <p:nvPr>
+            <p:ph type="subTitle" idx="1"/>
+          </p:nvPr>
+        </p:nvSpPr>
+        <p:spPr>
+          <a:xfrm>
+            <a:off x="934019" y="1323224"/>
+            <a:ext cx="9437307" cy="3344115"/>
+          </a:xfrm>
+        </p:spPr>
+        <p:txBody>
+          <a:bodyPr/>
+          <a:lstStyle/>
+          <a:p>
+            <a:pPr marL="457200" indent="-457200">
+              <a:buFont typeface="+mj-lt"/>
+              <a:buAutoNum type="arabicPeriod"/>
+            </a:pPr>
+            <a:endParaRPr lang="es-ES" dirty="0"/>
+          </a:p>
+          <a:p>
+            <a:pPr marL="457200" indent="-457200" algn="l">
+              <a:lnSpc>
+                <a:spcPct val="200000"/>
+              </a:lnSpc>
+              <a:buFont typeface="+mj-lt"/>
+              <a:buAutoNum type="arabicPeriod"/>
+            </a:pPr>
+            <a:r>
+              <a:rPr lang="en-GB" b="1" dirty="0"/>
+              <a:t>Kalman filter </a:t>
+            </a:r>
+            <a:r>
+              <a:rPr lang="en-GB" dirty="0"/>
+              <a:t>implementation</a:t>
+            </a:r>
+          </a:p>
+          <a:p>
+            <a:pPr marL="457200" indent="-457200" algn="l">
+              <a:lnSpc>
+                <a:spcPct val="200000"/>
+              </a:lnSpc>
+              <a:buFont typeface="+mj-lt"/>
+              <a:buAutoNum type="arabicPeriod"/>
+            </a:pPr>
+            <a:r>
+              <a:rPr lang="en-GB" dirty="0"/>
+              <a:t>Make sure the </a:t>
+            </a:r>
+            <a:r>
+              <a:rPr lang="en-GB" b="1" dirty="0"/>
+              <a:t>noise</a:t>
+            </a:r>
+            <a:r>
+              <a:rPr lang="en-GB" dirty="0"/>
+              <a:t> of the components is correct.</a:t>
+            </a:r>
+          </a:p>
+          <a:p>
+            <a:pPr marL="457200" indent="-457200" algn="l">
+              <a:lnSpc>
+                <a:spcPct val="200000"/>
+              </a:lnSpc>
+              <a:buFont typeface="+mj-lt"/>
+              <a:buAutoNum type="arabicPeriod"/>
+            </a:pPr>
+            <a:r>
+              <a:rPr lang="en-GB" dirty="0"/>
+              <a:t>Momentum wheel: “</a:t>
+            </a:r>
+            <a:r>
+              <a:rPr lang="en-GB" b="1" dirty="0"/>
+              <a:t>mise </a:t>
+            </a:r>
+            <a:r>
+              <a:rPr lang="en-GB" b="1" dirty="0" err="1"/>
+              <a:t>en</a:t>
+            </a:r>
+            <a:r>
+              <a:rPr lang="en-GB" b="1" dirty="0"/>
+              <a:t> </a:t>
+            </a:r>
+            <a:r>
+              <a:rPr lang="en-GB" b="1" dirty="0" err="1"/>
+              <a:t>vitesse</a:t>
+            </a:r>
+            <a:r>
+              <a:rPr lang="en-GB" dirty="0"/>
+              <a:t>” around y-axis </a:t>
+            </a:r>
+          </a:p>
+          <a:p>
+            <a:pPr marL="457200" indent="-457200" algn="l">
+              <a:buFont typeface="+mj-lt"/>
+              <a:buAutoNum type="arabicPeriod"/>
+            </a:pPr>
+            <a:endParaRPr lang="en-GB" dirty="0"/>
+          </a:p>
+        </p:txBody>
+      </p:sp>
+      <p:sp>
+        <p:nvSpPr>
+          <p:cNvPr id="4" name="Slide Number Placeholder 3">
+            <a:extLst>
+              <a:ext uri="{FF2B5EF4-FFF2-40B4-BE49-F238E27FC236}">
+                <a16:creationId xmlns:a16="http://schemas.microsoft.com/office/drawing/2014/main" id="{D9830B64-BD5B-432D-BB8F-8F8F8891DC9E}"/>
+              </a:ext>
+            </a:extLst>
+          </p:cNvPr>
+          <p:cNvSpPr>
+            <a:spLocks noGrp="1"/>
+          </p:cNvSpPr>
+          <p:nvPr>
+            <p:ph type="sldNum" sz="quarter" idx="12"/>
+          </p:nvPr>
+        </p:nvSpPr>
+        <p:spPr/>
+        <p:txBody>
+          <a:bodyPr/>
+          <a:lstStyle/>
+          <a:p>
+            <a:fld id="{9E937E72-11F5-44A2-9DC0-74EEC05A6D21}" type="slidenum">
+              <a:rPr lang="en-US" smtClean="0"/>
+              <a:pPr/>
+              <a:t>10</a:t>
+            </a:fld>
+            <a:endParaRPr lang="en-US" dirty="0"/>
+          </a:p>
+        </p:txBody>
+      </p:sp>
+      <p:sp>
+        <p:nvSpPr>
+          <p:cNvPr id="5" name="Text Placeholder 4">
+            <a:extLst>
+              <a:ext uri="{FF2B5EF4-FFF2-40B4-BE49-F238E27FC236}">
+                <a16:creationId xmlns:a16="http://schemas.microsoft.com/office/drawing/2014/main" id="{0755B8F9-1282-403A-8C88-75C4BA6199B2}"/>
+              </a:ext>
+            </a:extLst>
+          </p:cNvPr>
+          <p:cNvSpPr>
+            <a:spLocks noGrp="1"/>
+          </p:cNvSpPr>
+          <p:nvPr>
+            <p:ph type="body" sz="quarter" idx="13"/>
+          </p:nvPr>
+        </p:nvSpPr>
+        <p:spPr/>
+        <p:txBody>
+          <a:bodyPr/>
+          <a:lstStyle/>
+          <a:p>
+            <a:endParaRPr lang="en-GB"/>
+          </a:p>
+        </p:txBody>
+      </p:sp>
+    </p:spTree>
+    <p:extLst>
+      <p:ext uri="{BB962C8B-B14F-4D97-AF65-F5344CB8AC3E}">
+        <p14:creationId xmlns:p14="http://schemas.microsoft.com/office/powerpoint/2010/main" val="3909921268"/>
+      </p:ext>
+    </p:extLst>
+  </p:cSld>
+  <p:clrMapOvr>
+    <a:masterClrMapping/>
+  </p:clrMapOvr>
+</p:sld>
+</file>
+
+<file path=ppt/slides/slide11.xml><?xml version="1.0" encoding="utf-8"?>
 <p:sld xmlns:a="http://schemas.openxmlformats.org/drawingml/2006/main" xmlns:r="http://schemas.openxmlformats.org/officeDocument/2006/relationships" xmlns:p="http://schemas.openxmlformats.org/presentationml/2006/main">
   <p:cSld>
     <p:spTree>
@@ -5664,7 +5923,7 @@
 </p:sld>
 </file>
 
-<file path=ppt/slides/slide11.xml><?xml version="1.0" encoding="utf-8"?>
+<file path=ppt/slides/slide12.xml><?xml version="1.0" encoding="utf-8"?>
 <p:sld xmlns:a="http://schemas.openxmlformats.org/drawingml/2006/main" xmlns:r="http://schemas.openxmlformats.org/officeDocument/2006/relationships" xmlns:p="http://schemas.openxmlformats.org/presentationml/2006/main">
   <p:cSld>
     <p:spTree>
@@ -5875,7 +6134,7 @@
 </p:sld>
 </file>
 
-<file path=ppt/slides/slide12.xml><?xml version="1.0" encoding="utf-8"?>
+<file path=ppt/slides/slide13.xml><?xml version="1.0" encoding="utf-8"?>
 <p:sld xmlns:a="http://schemas.openxmlformats.org/drawingml/2006/main" xmlns:r="http://schemas.openxmlformats.org/officeDocument/2006/relationships" xmlns:p="http://schemas.openxmlformats.org/presentationml/2006/main">
   <p:cSld>
     <p:spTree>
@@ -9958,7 +10217,7 @@
           <a:lstStyle/>
           <a:p>
             <a:r>
-              <a:rPr lang="ca" sz="5867">
+              <a:rPr lang="ca" sz="5867" dirty="0">
                 <a:latin typeface="Calibri"/>
                 <a:ea typeface="Calibri"/>
                 <a:cs typeface="Calibri"/>
@@ -9966,7 +10225,7 @@
               </a:rPr>
               <a:t>Conclusions</a:t>
             </a:r>
-            <a:endParaRPr/>
+            <a:endParaRPr dirty="0"/>
           </a:p>
         </p:txBody>
       </p:sp>

</xml_diff>